<commit_message>
number of paragraph and character styles added
</commit_message>
<xml_diff>
--- a/Presentation/Lehecka-RIDICS-TEI2019-DOCX-to-XML-TEI.pptx
+++ b/Presentation/Lehecka-RIDICS-TEI2019-DOCX-to-XML-TEI.pptx
@@ -428,7 +428,7 @@
           <a:p>
             <a:fld id="{693D0AAB-BC65-4D93-BE30-329DE1D7C511}" type="datetimeFigureOut">
               <a:rPr lang="cs-CZ" smtClean="0"/>
-              <a:t>19.09.2019</a:t>
+              <a:t>20.09.2019</a:t>
             </a:fld>
             <a:endParaRPr lang="cs-CZ"/>
           </a:p>
@@ -537,7 +537,7 @@
           <a:p>
             <a:fld id="{BF6F0682-C2CD-439F-BD5E-D51593A61157}" type="datetimeFigureOut">
               <a:rPr lang="cs-CZ" smtClean="0"/>
-              <a:t>19.09.2019</a:t>
+              <a:t>20.09.2019</a:t>
             </a:fld>
             <a:endParaRPr lang="cs-CZ"/>
           </a:p>
@@ -1136,9 +1136,13 @@
           <a:p>
             <a:fld id="{5B64AE77-6BC1-49CA-AA73-E9D0D5F1D944}" type="slidenum">
               <a:rPr lang="cs-CZ" smtClean="0"/>
+              <a:pPr/>
               <a:t>‹#›</a:t>
             </a:fld>
-            <a:endParaRPr lang="cs-CZ" dirty="0"/>
+            <a:r>
+              <a:rPr lang="cs-CZ" dirty="0"/>
+              <a:t>/21</a:t>
+            </a:r>
           </a:p>
         </p:txBody>
       </p:sp>
@@ -1805,9 +1809,13 @@
           <a:p>
             <a:fld id="{5B64AE77-6BC1-49CA-AA73-E9D0D5F1D944}" type="slidenum">
               <a:rPr lang="cs-CZ" smtClean="0"/>
+              <a:pPr/>
               <a:t>‹#›</a:t>
             </a:fld>
-            <a:endParaRPr lang="cs-CZ" dirty="0"/>
+            <a:r>
+              <a:rPr lang="cs-CZ" dirty="0"/>
+              <a:t>/21</a:t>
+            </a:r>
           </a:p>
         </p:txBody>
       </p:sp>
@@ -2354,9 +2362,13 @@
           <a:p>
             <a:fld id="{5B64AE77-6BC1-49CA-AA73-E9D0D5F1D944}" type="slidenum">
               <a:rPr lang="cs-CZ" smtClean="0"/>
+              <a:pPr/>
               <a:t>‹#›</a:t>
             </a:fld>
-            <a:endParaRPr lang="cs-CZ" dirty="0"/>
+            <a:r>
+              <a:rPr lang="cs-CZ" dirty="0"/>
+              <a:t>/21</a:t>
+            </a:r>
           </a:p>
         </p:txBody>
       </p:sp>
@@ -2772,9 +2784,13 @@
           <a:p>
             <a:fld id="{5B64AE77-6BC1-49CA-AA73-E9D0D5F1D944}" type="slidenum">
               <a:rPr lang="cs-CZ" smtClean="0"/>
+              <a:pPr/>
               <a:t>‹#›</a:t>
             </a:fld>
-            <a:endParaRPr lang="cs-CZ" dirty="0"/>
+            <a:r>
+              <a:rPr lang="cs-CZ" dirty="0"/>
+              <a:t>/21</a:t>
+            </a:r>
           </a:p>
         </p:txBody>
       </p:sp>
@@ -2917,9 +2933,13 @@
           <a:p>
             <a:fld id="{5B64AE77-6BC1-49CA-AA73-E9D0D5F1D944}" type="slidenum">
               <a:rPr lang="cs-CZ" smtClean="0"/>
+              <a:pPr/>
               <a:t>‹#›</a:t>
             </a:fld>
-            <a:endParaRPr lang="cs-CZ" dirty="0"/>
+            <a:r>
+              <a:rPr lang="cs-CZ" dirty="0"/>
+              <a:t>/21</a:t>
+            </a:r>
           </a:p>
         </p:txBody>
       </p:sp>
@@ -3034,9 +3054,13 @@
           <a:p>
             <a:fld id="{5B64AE77-6BC1-49CA-AA73-E9D0D5F1D944}" type="slidenum">
               <a:rPr lang="cs-CZ" smtClean="0"/>
+              <a:pPr/>
               <a:t>‹#›</a:t>
             </a:fld>
-            <a:endParaRPr lang="cs-CZ" dirty="0"/>
+            <a:r>
+              <a:rPr lang="cs-CZ" dirty="0"/>
+              <a:t>/21</a:t>
+            </a:r>
           </a:p>
         </p:txBody>
       </p:sp>
@@ -4253,7 +4277,10 @@
               <a:pPr/>
               <a:t>‹#›</a:t>
             </a:fld>
-            <a:endParaRPr lang="cs-CZ" dirty="0"/>
+            <a:r>
+              <a:rPr lang="cs-CZ" dirty="0"/>
+              <a:t>/21</a:t>
+            </a:r>
           </a:p>
         </p:txBody>
       </p:sp>
@@ -4594,7 +4621,7 @@
     <p:sldLayoutId id="2147483658" r:id="rId10"/>
     <p:sldLayoutId id="2147483659" r:id="rId11"/>
   </p:sldLayoutIdLst>
-  <p:hf sldNum="0" hdr="0"/>
+  <p:hf hdr="0"/>
   <p:txStyles>
     <p:titleStyle>
       <a:lvl1pPr algn="l" defTabSz="914400" rtl="0" eaLnBrk="1" latinLnBrk="0" hangingPunct="1">
@@ -5333,10 +5360,10 @@
       </p:sp>
       <p:sp>
         <p:nvSpPr>
-          <p:cNvPr id="2" name="Zástupný symbol pro datum 1">
-            <a:extLst>
-              <a:ext uri="{FF2B5EF4-FFF2-40B4-BE49-F238E27FC236}">
-                <a16:creationId xmlns:a16="http://schemas.microsoft.com/office/drawing/2014/main" id="{A86A225D-A4ED-4493-94F7-A4EE672FFA74}"/>
+          <p:cNvPr id="7" name="Zástupný symbol pro datum 6">
+            <a:extLst>
+              <a:ext uri="{FF2B5EF4-FFF2-40B4-BE49-F238E27FC236}">
+                <a16:creationId xmlns:a16="http://schemas.microsoft.com/office/drawing/2014/main" id="{DADFFA0F-735A-4742-9328-816B96B13DC6}"/>
               </a:ext>
             </a:extLst>
           </p:cNvPr>
@@ -5362,10 +5389,10 @@
       </p:sp>
       <p:sp>
         <p:nvSpPr>
-          <p:cNvPr id="3" name="Zástupný symbol pro zápatí 2">
-            <a:extLst>
-              <a:ext uri="{FF2B5EF4-FFF2-40B4-BE49-F238E27FC236}">
-                <a16:creationId xmlns:a16="http://schemas.microsoft.com/office/drawing/2014/main" id="{47011647-09F4-4D6C-885D-4C6178032D8B}"/>
+          <p:cNvPr id="8" name="Zástupný symbol pro zápatí 7">
+            <a:extLst>
+              <a:ext uri="{FF2B5EF4-FFF2-40B4-BE49-F238E27FC236}">
+                <a16:creationId xmlns:a16="http://schemas.microsoft.com/office/drawing/2014/main" id="{6D7A186C-E2A3-464B-99B3-2F2C19A9CE29}"/>
               </a:ext>
             </a:extLst>
           </p:cNvPr>
@@ -5385,6 +5412,35 @@
               <a:rPr lang="en-US"/>
               <a:t>Using Microsoft Word for preparing XML TEI-compliant digital editions</a:t>
             </a:r>
+            <a:endParaRPr lang="cs-CZ" dirty="0"/>
+          </a:p>
+        </p:txBody>
+      </p:sp>
+      <p:sp>
+        <p:nvSpPr>
+          <p:cNvPr id="9" name="Zástupný symbol pro číslo snímku 8">
+            <a:extLst>
+              <a:ext uri="{FF2B5EF4-FFF2-40B4-BE49-F238E27FC236}">
+                <a16:creationId xmlns:a16="http://schemas.microsoft.com/office/drawing/2014/main" id="{DA2385B3-CFD8-4793-9730-FE825F71A1D4}"/>
+              </a:ext>
+            </a:extLst>
+          </p:cNvPr>
+          <p:cNvSpPr>
+            <a:spLocks noGrp="1"/>
+          </p:cNvSpPr>
+          <p:nvPr>
+            <p:ph type="sldNum" sz="quarter" idx="12"/>
+          </p:nvPr>
+        </p:nvSpPr>
+        <p:spPr/>
+        <p:txBody>
+          <a:bodyPr/>
+          <a:lstStyle/>
+          <a:p>
+            <a:fld id="{5B64AE77-6BC1-49CA-AA73-E9D0D5F1D944}" type="slidenum">
+              <a:rPr lang="cs-CZ" smtClean="0"/>
+              <a:t>10</a:t>
+            </a:fld>
             <a:endParaRPr lang="cs-CZ" dirty="0"/>
           </a:p>
         </p:txBody>
@@ -5419,64 +5475,6 @@
           <a:chExt cx="0" cy="0"/>
         </a:xfrm>
       </p:grpSpPr>
-      <p:sp>
-        <p:nvSpPr>
-          <p:cNvPr id="4" name="Zástupný symbol pro datum 3">
-            <a:extLst>
-              <a:ext uri="{FF2B5EF4-FFF2-40B4-BE49-F238E27FC236}">
-                <a16:creationId xmlns:a16="http://schemas.microsoft.com/office/drawing/2014/main" id="{8CF5B428-BEAF-42ED-A368-1D32E1E5C598}"/>
-              </a:ext>
-            </a:extLst>
-          </p:cNvPr>
-          <p:cNvSpPr>
-            <a:spLocks noGrp="1"/>
-          </p:cNvSpPr>
-          <p:nvPr>
-            <p:ph type="dt" sz="half" idx="10"/>
-          </p:nvPr>
-        </p:nvSpPr>
-        <p:spPr/>
-        <p:txBody>
-          <a:bodyPr/>
-          <a:lstStyle/>
-          <a:p>
-            <a:r>
-              <a:rPr lang="cs-CZ"/>
-              <a:t>TEI 2019, Graz, 2019-09-20</a:t>
-            </a:r>
-            <a:endParaRPr lang="cs-CZ" dirty="0"/>
-          </a:p>
-        </p:txBody>
-      </p:sp>
-      <p:sp>
-        <p:nvSpPr>
-          <p:cNvPr id="5" name="Zástupný symbol pro zápatí 4">
-            <a:extLst>
-              <a:ext uri="{FF2B5EF4-FFF2-40B4-BE49-F238E27FC236}">
-                <a16:creationId xmlns:a16="http://schemas.microsoft.com/office/drawing/2014/main" id="{EF386029-C061-43F9-9D01-20061735509E}"/>
-              </a:ext>
-            </a:extLst>
-          </p:cNvPr>
-          <p:cNvSpPr>
-            <a:spLocks noGrp="1"/>
-          </p:cNvSpPr>
-          <p:nvPr>
-            <p:ph type="ftr" sz="quarter" idx="11"/>
-          </p:nvPr>
-        </p:nvSpPr>
-        <p:spPr/>
-        <p:txBody>
-          <a:bodyPr/>
-          <a:lstStyle/>
-          <a:p>
-            <a:r>
-              <a:rPr lang="en-US"/>
-              <a:t>Using Microsoft Word for preparing XML TEI-compliant digital editions</a:t>
-            </a:r>
-            <a:endParaRPr lang="cs-CZ" dirty="0"/>
-          </a:p>
-        </p:txBody>
-      </p:sp>
       <p:pic>
         <p:nvPicPr>
           <p:cNvPr id="7" name="Zástupný obsah 6">
@@ -5512,6 +5510,93 @@
           </a:xfrm>
         </p:spPr>
       </p:pic>
+      <p:sp>
+        <p:nvSpPr>
+          <p:cNvPr id="3" name="Zástupný symbol pro datum 2">
+            <a:extLst>
+              <a:ext uri="{FF2B5EF4-FFF2-40B4-BE49-F238E27FC236}">
+                <a16:creationId xmlns:a16="http://schemas.microsoft.com/office/drawing/2014/main" id="{2F111743-48D9-4012-AEB4-BC121B11EE16}"/>
+              </a:ext>
+            </a:extLst>
+          </p:cNvPr>
+          <p:cNvSpPr>
+            <a:spLocks noGrp="1"/>
+          </p:cNvSpPr>
+          <p:nvPr>
+            <p:ph type="dt" sz="half" idx="10"/>
+          </p:nvPr>
+        </p:nvSpPr>
+        <p:spPr/>
+        <p:txBody>
+          <a:bodyPr/>
+          <a:lstStyle/>
+          <a:p>
+            <a:r>
+              <a:rPr lang="cs-CZ"/>
+              <a:t>TEI 2019, Graz, 2019-09-20</a:t>
+            </a:r>
+            <a:endParaRPr lang="cs-CZ" dirty="0"/>
+          </a:p>
+        </p:txBody>
+      </p:sp>
+      <p:sp>
+        <p:nvSpPr>
+          <p:cNvPr id="6" name="Zástupný symbol pro zápatí 5">
+            <a:extLst>
+              <a:ext uri="{FF2B5EF4-FFF2-40B4-BE49-F238E27FC236}">
+                <a16:creationId xmlns:a16="http://schemas.microsoft.com/office/drawing/2014/main" id="{57268309-3AA3-408E-B3CD-D239F4843D1B}"/>
+              </a:ext>
+            </a:extLst>
+          </p:cNvPr>
+          <p:cNvSpPr>
+            <a:spLocks noGrp="1"/>
+          </p:cNvSpPr>
+          <p:nvPr>
+            <p:ph type="ftr" sz="quarter" idx="11"/>
+          </p:nvPr>
+        </p:nvSpPr>
+        <p:spPr/>
+        <p:txBody>
+          <a:bodyPr/>
+          <a:lstStyle/>
+          <a:p>
+            <a:r>
+              <a:rPr lang="en-US"/>
+              <a:t>Using Microsoft Word for preparing XML TEI-compliant digital editions</a:t>
+            </a:r>
+            <a:endParaRPr lang="cs-CZ" dirty="0"/>
+          </a:p>
+        </p:txBody>
+      </p:sp>
+      <p:sp>
+        <p:nvSpPr>
+          <p:cNvPr id="8" name="Zástupný symbol pro číslo snímku 7">
+            <a:extLst>
+              <a:ext uri="{FF2B5EF4-FFF2-40B4-BE49-F238E27FC236}">
+                <a16:creationId xmlns:a16="http://schemas.microsoft.com/office/drawing/2014/main" id="{B17DDBCA-560A-453F-B2C8-9A51ACBA4082}"/>
+              </a:ext>
+            </a:extLst>
+          </p:cNvPr>
+          <p:cNvSpPr>
+            <a:spLocks noGrp="1"/>
+          </p:cNvSpPr>
+          <p:nvPr>
+            <p:ph type="sldNum" sz="quarter" idx="12"/>
+          </p:nvPr>
+        </p:nvSpPr>
+        <p:spPr/>
+        <p:txBody>
+          <a:bodyPr/>
+          <a:lstStyle/>
+          <a:p>
+            <a:fld id="{5B64AE77-6BC1-49CA-AA73-E9D0D5F1D944}" type="slidenum">
+              <a:rPr lang="cs-CZ" smtClean="0"/>
+              <a:t>11</a:t>
+            </a:fld>
+            <a:endParaRPr lang="cs-CZ" dirty="0"/>
+          </a:p>
+        </p:txBody>
+      </p:sp>
     </p:spTree>
     <p:extLst>
       <p:ext uri="{BB962C8B-B14F-4D97-AF65-F5344CB8AC3E}">
@@ -5571,64 +5656,6 @@
           </a:p>
         </p:txBody>
       </p:sp>
-      <p:sp>
-        <p:nvSpPr>
-          <p:cNvPr id="2" name="Zástupný symbol pro datum 1">
-            <a:extLst>
-              <a:ext uri="{FF2B5EF4-FFF2-40B4-BE49-F238E27FC236}">
-                <a16:creationId xmlns:a16="http://schemas.microsoft.com/office/drawing/2014/main" id="{F898FB34-AF3C-4E5E-B7D5-0FBE88CC19A6}"/>
-              </a:ext>
-            </a:extLst>
-          </p:cNvPr>
-          <p:cNvSpPr>
-            <a:spLocks noGrp="1"/>
-          </p:cNvSpPr>
-          <p:nvPr>
-            <p:ph type="dt" sz="half" idx="10"/>
-          </p:nvPr>
-        </p:nvSpPr>
-        <p:spPr/>
-        <p:txBody>
-          <a:bodyPr/>
-          <a:lstStyle/>
-          <a:p>
-            <a:r>
-              <a:rPr lang="cs-CZ"/>
-              <a:t>TEI 2019, Graz, 2019-09-20</a:t>
-            </a:r>
-            <a:endParaRPr lang="cs-CZ" dirty="0"/>
-          </a:p>
-        </p:txBody>
-      </p:sp>
-      <p:sp>
-        <p:nvSpPr>
-          <p:cNvPr id="3" name="Zástupný symbol pro zápatí 2">
-            <a:extLst>
-              <a:ext uri="{FF2B5EF4-FFF2-40B4-BE49-F238E27FC236}">
-                <a16:creationId xmlns:a16="http://schemas.microsoft.com/office/drawing/2014/main" id="{BA3B9C64-3BC1-43F6-B6CA-5E050EDF3CFC}"/>
-              </a:ext>
-            </a:extLst>
-          </p:cNvPr>
-          <p:cNvSpPr>
-            <a:spLocks noGrp="1"/>
-          </p:cNvSpPr>
-          <p:nvPr>
-            <p:ph type="ftr" sz="quarter" idx="11"/>
-          </p:nvPr>
-        </p:nvSpPr>
-        <p:spPr/>
-        <p:txBody>
-          <a:bodyPr/>
-          <a:lstStyle/>
-          <a:p>
-            <a:r>
-              <a:rPr lang="en-US"/>
-              <a:t>Using Microsoft Word for preparing XML TEI-compliant digital editions</a:t>
-            </a:r>
-            <a:endParaRPr lang="cs-CZ" dirty="0"/>
-          </a:p>
-        </p:txBody>
-      </p:sp>
       <p:pic>
         <p:nvPicPr>
           <p:cNvPr id="11" name="Zástupný obsah 10">
@@ -5663,6 +5690,93 @@
           </a:xfrm>
         </p:spPr>
       </p:pic>
+      <p:sp>
+        <p:nvSpPr>
+          <p:cNvPr id="6" name="Zástupný symbol pro datum 5">
+            <a:extLst>
+              <a:ext uri="{FF2B5EF4-FFF2-40B4-BE49-F238E27FC236}">
+                <a16:creationId xmlns:a16="http://schemas.microsoft.com/office/drawing/2014/main" id="{7AA37337-2981-471B-B123-39A582AB5629}"/>
+              </a:ext>
+            </a:extLst>
+          </p:cNvPr>
+          <p:cNvSpPr>
+            <a:spLocks noGrp="1"/>
+          </p:cNvSpPr>
+          <p:nvPr>
+            <p:ph type="dt" sz="half" idx="10"/>
+          </p:nvPr>
+        </p:nvSpPr>
+        <p:spPr/>
+        <p:txBody>
+          <a:bodyPr/>
+          <a:lstStyle/>
+          <a:p>
+            <a:r>
+              <a:rPr lang="cs-CZ"/>
+              <a:t>TEI 2019, Graz, 2019-09-20</a:t>
+            </a:r>
+            <a:endParaRPr lang="cs-CZ" dirty="0"/>
+          </a:p>
+        </p:txBody>
+      </p:sp>
+      <p:sp>
+        <p:nvSpPr>
+          <p:cNvPr id="7" name="Zástupný symbol pro zápatí 6">
+            <a:extLst>
+              <a:ext uri="{FF2B5EF4-FFF2-40B4-BE49-F238E27FC236}">
+                <a16:creationId xmlns:a16="http://schemas.microsoft.com/office/drawing/2014/main" id="{95DE37D6-F2F7-49C5-9341-919D0C6591B4}"/>
+              </a:ext>
+            </a:extLst>
+          </p:cNvPr>
+          <p:cNvSpPr>
+            <a:spLocks noGrp="1"/>
+          </p:cNvSpPr>
+          <p:nvPr>
+            <p:ph type="ftr" sz="quarter" idx="11"/>
+          </p:nvPr>
+        </p:nvSpPr>
+        <p:spPr/>
+        <p:txBody>
+          <a:bodyPr/>
+          <a:lstStyle/>
+          <a:p>
+            <a:r>
+              <a:rPr lang="en-US"/>
+              <a:t>Using Microsoft Word for preparing XML TEI-compliant digital editions</a:t>
+            </a:r>
+            <a:endParaRPr lang="cs-CZ" dirty="0"/>
+          </a:p>
+        </p:txBody>
+      </p:sp>
+      <p:sp>
+        <p:nvSpPr>
+          <p:cNvPr id="8" name="Zástupný symbol pro číslo snímku 7">
+            <a:extLst>
+              <a:ext uri="{FF2B5EF4-FFF2-40B4-BE49-F238E27FC236}">
+                <a16:creationId xmlns:a16="http://schemas.microsoft.com/office/drawing/2014/main" id="{CE3DA5A1-EB28-43E8-A10F-C5830810036F}"/>
+              </a:ext>
+            </a:extLst>
+          </p:cNvPr>
+          <p:cNvSpPr>
+            <a:spLocks noGrp="1"/>
+          </p:cNvSpPr>
+          <p:nvPr>
+            <p:ph type="sldNum" sz="quarter" idx="12"/>
+          </p:nvPr>
+        </p:nvSpPr>
+        <p:spPr/>
+        <p:txBody>
+          <a:bodyPr/>
+          <a:lstStyle/>
+          <a:p>
+            <a:fld id="{5B64AE77-6BC1-49CA-AA73-E9D0D5F1D944}" type="slidenum">
+              <a:rPr lang="cs-CZ" smtClean="0"/>
+              <a:t>12</a:t>
+            </a:fld>
+            <a:endParaRPr lang="cs-CZ" dirty="0"/>
+          </a:p>
+        </p:txBody>
+      </p:sp>
     </p:spTree>
     <p:extLst>
       <p:ext uri="{BB962C8B-B14F-4D97-AF65-F5344CB8AC3E}">
@@ -5693,64 +5807,6 @@
           <a:chExt cx="0" cy="0"/>
         </a:xfrm>
       </p:grpSpPr>
-      <p:sp>
-        <p:nvSpPr>
-          <p:cNvPr id="4" name="Zástupný symbol pro datum 3">
-            <a:extLst>
-              <a:ext uri="{FF2B5EF4-FFF2-40B4-BE49-F238E27FC236}">
-                <a16:creationId xmlns:a16="http://schemas.microsoft.com/office/drawing/2014/main" id="{E04B8836-2016-4511-A297-33F048F8CE21}"/>
-              </a:ext>
-            </a:extLst>
-          </p:cNvPr>
-          <p:cNvSpPr>
-            <a:spLocks noGrp="1"/>
-          </p:cNvSpPr>
-          <p:nvPr>
-            <p:ph type="dt" sz="half" idx="10"/>
-          </p:nvPr>
-        </p:nvSpPr>
-        <p:spPr/>
-        <p:txBody>
-          <a:bodyPr/>
-          <a:lstStyle/>
-          <a:p>
-            <a:r>
-              <a:rPr lang="cs-CZ"/>
-              <a:t>TEI 2019, Graz, 2019-09-20</a:t>
-            </a:r>
-            <a:endParaRPr lang="cs-CZ" dirty="0"/>
-          </a:p>
-        </p:txBody>
-      </p:sp>
-      <p:sp>
-        <p:nvSpPr>
-          <p:cNvPr id="5" name="Zástupný symbol pro zápatí 4">
-            <a:extLst>
-              <a:ext uri="{FF2B5EF4-FFF2-40B4-BE49-F238E27FC236}">
-                <a16:creationId xmlns:a16="http://schemas.microsoft.com/office/drawing/2014/main" id="{36F02FDC-6EA3-4723-AAB6-1A48C39DF4DC}"/>
-              </a:ext>
-            </a:extLst>
-          </p:cNvPr>
-          <p:cNvSpPr>
-            <a:spLocks noGrp="1"/>
-          </p:cNvSpPr>
-          <p:nvPr>
-            <p:ph type="ftr" sz="quarter" idx="11"/>
-          </p:nvPr>
-        </p:nvSpPr>
-        <p:spPr/>
-        <p:txBody>
-          <a:bodyPr/>
-          <a:lstStyle/>
-          <a:p>
-            <a:r>
-              <a:rPr lang="en-US"/>
-              <a:t>Using Microsoft Word for preparing XML TEI-compliant digital editions</a:t>
-            </a:r>
-            <a:endParaRPr lang="cs-CZ" dirty="0"/>
-          </a:p>
-        </p:txBody>
-      </p:sp>
       <p:pic>
         <p:nvPicPr>
           <p:cNvPr id="7" name="Zástupný obsah 6">
@@ -5786,6 +5842,93 @@
           </a:xfrm>
         </p:spPr>
       </p:pic>
+      <p:sp>
+        <p:nvSpPr>
+          <p:cNvPr id="3" name="Zástupný symbol pro datum 2">
+            <a:extLst>
+              <a:ext uri="{FF2B5EF4-FFF2-40B4-BE49-F238E27FC236}">
+                <a16:creationId xmlns:a16="http://schemas.microsoft.com/office/drawing/2014/main" id="{084F6690-B03A-4409-96F4-DFBF1FBE2CA4}"/>
+              </a:ext>
+            </a:extLst>
+          </p:cNvPr>
+          <p:cNvSpPr>
+            <a:spLocks noGrp="1"/>
+          </p:cNvSpPr>
+          <p:nvPr>
+            <p:ph type="dt" sz="half" idx="10"/>
+          </p:nvPr>
+        </p:nvSpPr>
+        <p:spPr/>
+        <p:txBody>
+          <a:bodyPr/>
+          <a:lstStyle/>
+          <a:p>
+            <a:r>
+              <a:rPr lang="cs-CZ"/>
+              <a:t>TEI 2019, Graz, 2019-09-20</a:t>
+            </a:r>
+            <a:endParaRPr lang="cs-CZ" dirty="0"/>
+          </a:p>
+        </p:txBody>
+      </p:sp>
+      <p:sp>
+        <p:nvSpPr>
+          <p:cNvPr id="6" name="Zástupný symbol pro zápatí 5">
+            <a:extLst>
+              <a:ext uri="{FF2B5EF4-FFF2-40B4-BE49-F238E27FC236}">
+                <a16:creationId xmlns:a16="http://schemas.microsoft.com/office/drawing/2014/main" id="{E1456AAE-3179-4097-BE2A-A163960BFAD7}"/>
+              </a:ext>
+            </a:extLst>
+          </p:cNvPr>
+          <p:cNvSpPr>
+            <a:spLocks noGrp="1"/>
+          </p:cNvSpPr>
+          <p:nvPr>
+            <p:ph type="ftr" sz="quarter" idx="11"/>
+          </p:nvPr>
+        </p:nvSpPr>
+        <p:spPr/>
+        <p:txBody>
+          <a:bodyPr/>
+          <a:lstStyle/>
+          <a:p>
+            <a:r>
+              <a:rPr lang="en-US"/>
+              <a:t>Using Microsoft Word for preparing XML TEI-compliant digital editions</a:t>
+            </a:r>
+            <a:endParaRPr lang="cs-CZ" dirty="0"/>
+          </a:p>
+        </p:txBody>
+      </p:sp>
+      <p:sp>
+        <p:nvSpPr>
+          <p:cNvPr id="8" name="Zástupný symbol pro číslo snímku 7">
+            <a:extLst>
+              <a:ext uri="{FF2B5EF4-FFF2-40B4-BE49-F238E27FC236}">
+                <a16:creationId xmlns:a16="http://schemas.microsoft.com/office/drawing/2014/main" id="{C3F33390-FBFB-4D65-AA8D-1D89EAF54C47}"/>
+              </a:ext>
+            </a:extLst>
+          </p:cNvPr>
+          <p:cNvSpPr>
+            <a:spLocks noGrp="1"/>
+          </p:cNvSpPr>
+          <p:nvPr>
+            <p:ph type="sldNum" sz="quarter" idx="12"/>
+          </p:nvPr>
+        </p:nvSpPr>
+        <p:spPr/>
+        <p:txBody>
+          <a:bodyPr/>
+          <a:lstStyle/>
+          <a:p>
+            <a:fld id="{5B64AE77-6BC1-49CA-AA73-E9D0D5F1D944}" type="slidenum">
+              <a:rPr lang="cs-CZ" smtClean="0"/>
+              <a:t>13</a:t>
+            </a:fld>
+            <a:endParaRPr lang="cs-CZ" dirty="0"/>
+          </a:p>
+        </p:txBody>
+      </p:sp>
     </p:spTree>
     <p:extLst>
       <p:ext uri="{BB962C8B-B14F-4D97-AF65-F5344CB8AC3E}">
@@ -5918,10 +6061,10 @@
       </p:sp>
       <p:sp>
         <p:nvSpPr>
-          <p:cNvPr id="2" name="Zástupný symbol pro datum 1">
-            <a:extLst>
-              <a:ext uri="{FF2B5EF4-FFF2-40B4-BE49-F238E27FC236}">
-                <a16:creationId xmlns:a16="http://schemas.microsoft.com/office/drawing/2014/main" id="{1837B7EE-569C-4E23-ADCC-12D506E2E02A}"/>
+          <p:cNvPr id="7" name="Zástupný symbol pro datum 6">
+            <a:extLst>
+              <a:ext uri="{FF2B5EF4-FFF2-40B4-BE49-F238E27FC236}">
+                <a16:creationId xmlns:a16="http://schemas.microsoft.com/office/drawing/2014/main" id="{24FA7DA4-8FC7-4778-8B96-EAC9BF1E0DF5}"/>
               </a:ext>
             </a:extLst>
           </p:cNvPr>
@@ -5941,16 +6084,16 @@
               <a:rPr lang="cs-CZ"/>
               <a:t>TEI 2019, Graz, 2019-09-20</a:t>
             </a:r>
-            <a:endParaRPr lang="en-US"/>
-          </a:p>
-        </p:txBody>
-      </p:sp>
-      <p:sp>
-        <p:nvSpPr>
-          <p:cNvPr id="3" name="Zástupný symbol pro zápatí 2">
-            <a:extLst>
-              <a:ext uri="{FF2B5EF4-FFF2-40B4-BE49-F238E27FC236}">
-                <a16:creationId xmlns:a16="http://schemas.microsoft.com/office/drawing/2014/main" id="{549356A2-B733-425B-93C4-02CC09EB1111}"/>
+            <a:endParaRPr lang="cs-CZ" dirty="0"/>
+          </a:p>
+        </p:txBody>
+      </p:sp>
+      <p:sp>
+        <p:nvSpPr>
+          <p:cNvPr id="8" name="Zástupný symbol pro zápatí 7">
+            <a:extLst>
+              <a:ext uri="{FF2B5EF4-FFF2-40B4-BE49-F238E27FC236}">
+                <a16:creationId xmlns:a16="http://schemas.microsoft.com/office/drawing/2014/main" id="{D82C8A9E-EAC1-4C63-A224-D3CCFDDD64F8}"/>
               </a:ext>
             </a:extLst>
           </p:cNvPr>
@@ -5970,6 +6113,36 @@
               <a:rPr lang="en-US"/>
               <a:t>Using Microsoft Word for preparing XML TEI-compliant digital editions</a:t>
             </a:r>
+            <a:endParaRPr lang="cs-CZ" dirty="0"/>
+          </a:p>
+        </p:txBody>
+      </p:sp>
+      <p:sp>
+        <p:nvSpPr>
+          <p:cNvPr id="9" name="Zástupný symbol pro číslo snímku 8">
+            <a:extLst>
+              <a:ext uri="{FF2B5EF4-FFF2-40B4-BE49-F238E27FC236}">
+                <a16:creationId xmlns:a16="http://schemas.microsoft.com/office/drawing/2014/main" id="{6B96391A-8C5C-4899-8C42-3153E3818B72}"/>
+              </a:ext>
+            </a:extLst>
+          </p:cNvPr>
+          <p:cNvSpPr>
+            <a:spLocks noGrp="1"/>
+          </p:cNvSpPr>
+          <p:nvPr>
+            <p:ph type="sldNum" sz="quarter" idx="12"/>
+          </p:nvPr>
+        </p:nvSpPr>
+        <p:spPr/>
+        <p:txBody>
+          <a:bodyPr/>
+          <a:lstStyle/>
+          <a:p>
+            <a:fld id="{5B64AE77-6BC1-49CA-AA73-E9D0D5F1D944}" type="slidenum">
+              <a:rPr lang="cs-CZ" smtClean="0"/>
+              <a:t>14</a:t>
+            </a:fld>
+            <a:endParaRPr lang="cs-CZ" dirty="0"/>
           </a:p>
         </p:txBody>
       </p:sp>
@@ -6070,10 +6243,10 @@
       </p:pic>
       <p:sp>
         <p:nvSpPr>
-          <p:cNvPr id="4" name="Zástupný symbol pro datum 3">
-            <a:extLst>
-              <a:ext uri="{FF2B5EF4-FFF2-40B4-BE49-F238E27FC236}">
-                <a16:creationId xmlns:a16="http://schemas.microsoft.com/office/drawing/2014/main" id="{37243943-44C3-4D5B-B705-785D4EA8247E}"/>
+          <p:cNvPr id="6" name="Zástupný symbol pro datum 5">
+            <a:extLst>
+              <a:ext uri="{FF2B5EF4-FFF2-40B4-BE49-F238E27FC236}">
+                <a16:creationId xmlns:a16="http://schemas.microsoft.com/office/drawing/2014/main" id="{4D576B4E-DB92-40A9-A0D1-2C8C8A6791A2}"/>
               </a:ext>
             </a:extLst>
           </p:cNvPr>
@@ -6099,10 +6272,10 @@
       </p:sp>
       <p:sp>
         <p:nvSpPr>
-          <p:cNvPr id="5" name="Zástupný symbol pro zápatí 4">
-            <a:extLst>
-              <a:ext uri="{FF2B5EF4-FFF2-40B4-BE49-F238E27FC236}">
-                <a16:creationId xmlns:a16="http://schemas.microsoft.com/office/drawing/2014/main" id="{87C5943F-B64C-4E7A-BD7E-4BF8410BC938}"/>
+          <p:cNvPr id="8" name="Zástupný symbol pro zápatí 7">
+            <a:extLst>
+              <a:ext uri="{FF2B5EF4-FFF2-40B4-BE49-F238E27FC236}">
+                <a16:creationId xmlns:a16="http://schemas.microsoft.com/office/drawing/2014/main" id="{8C9C3EA7-E5E5-4504-A482-67761694C0B6}"/>
               </a:ext>
             </a:extLst>
           </p:cNvPr>
@@ -6122,6 +6295,35 @@
               <a:rPr lang="en-US"/>
               <a:t>Using Microsoft Word for preparing XML TEI-compliant digital editions</a:t>
             </a:r>
+            <a:endParaRPr lang="cs-CZ" dirty="0"/>
+          </a:p>
+        </p:txBody>
+      </p:sp>
+      <p:sp>
+        <p:nvSpPr>
+          <p:cNvPr id="9" name="Zástupný symbol pro číslo snímku 8">
+            <a:extLst>
+              <a:ext uri="{FF2B5EF4-FFF2-40B4-BE49-F238E27FC236}">
+                <a16:creationId xmlns:a16="http://schemas.microsoft.com/office/drawing/2014/main" id="{85D84F5E-7A5C-4BD2-9625-D67E4F135F29}"/>
+              </a:ext>
+            </a:extLst>
+          </p:cNvPr>
+          <p:cNvSpPr>
+            <a:spLocks noGrp="1"/>
+          </p:cNvSpPr>
+          <p:nvPr>
+            <p:ph type="sldNum" sz="quarter" idx="12"/>
+          </p:nvPr>
+        </p:nvSpPr>
+        <p:spPr/>
+        <p:txBody>
+          <a:bodyPr/>
+          <a:lstStyle/>
+          <a:p>
+            <a:fld id="{5B64AE77-6BC1-49CA-AA73-E9D0D5F1D944}" type="slidenum">
+              <a:rPr lang="cs-CZ" smtClean="0"/>
+              <a:t>15</a:t>
+            </a:fld>
             <a:endParaRPr lang="cs-CZ" dirty="0"/>
           </a:p>
         </p:txBody>
@@ -7193,10 +7395,10 @@
       </p:sp>
       <p:sp>
         <p:nvSpPr>
-          <p:cNvPr id="4" name="Zástupný symbol pro datum 3">
-            <a:extLst>
-              <a:ext uri="{FF2B5EF4-FFF2-40B4-BE49-F238E27FC236}">
-                <a16:creationId xmlns:a16="http://schemas.microsoft.com/office/drawing/2014/main" id="{7983E661-6AE5-4E9C-87DA-825E4CFF8BFA}"/>
+          <p:cNvPr id="10" name="Zástupný symbol pro datum 9">
+            <a:extLst>
+              <a:ext uri="{FF2B5EF4-FFF2-40B4-BE49-F238E27FC236}">
+                <a16:creationId xmlns:a16="http://schemas.microsoft.com/office/drawing/2014/main" id="{3F057357-656B-4319-BAC3-D7727A1FC7E7}"/>
               </a:ext>
             </a:extLst>
           </p:cNvPr>
@@ -7222,10 +7424,10 @@
       </p:sp>
       <p:sp>
         <p:nvSpPr>
-          <p:cNvPr id="5" name="Zástupný symbol pro zápatí 4">
-            <a:extLst>
-              <a:ext uri="{FF2B5EF4-FFF2-40B4-BE49-F238E27FC236}">
-                <a16:creationId xmlns:a16="http://schemas.microsoft.com/office/drawing/2014/main" id="{896FA1FF-3E58-4F8A-8E89-3BE33A051B83}"/>
+          <p:cNvPr id="11" name="Zástupný symbol pro zápatí 10">
+            <a:extLst>
+              <a:ext uri="{FF2B5EF4-FFF2-40B4-BE49-F238E27FC236}">
+                <a16:creationId xmlns:a16="http://schemas.microsoft.com/office/drawing/2014/main" id="{7B9D2866-4E81-4168-9177-441AFC4A3DFE}"/>
               </a:ext>
             </a:extLst>
           </p:cNvPr>
@@ -7245,6 +7447,35 @@
               <a:rPr lang="en-US"/>
               <a:t>Using Microsoft Word for preparing XML TEI-compliant digital editions</a:t>
             </a:r>
+            <a:endParaRPr lang="cs-CZ" dirty="0"/>
+          </a:p>
+        </p:txBody>
+      </p:sp>
+      <p:sp>
+        <p:nvSpPr>
+          <p:cNvPr id="12" name="Zástupný symbol pro číslo snímku 11">
+            <a:extLst>
+              <a:ext uri="{FF2B5EF4-FFF2-40B4-BE49-F238E27FC236}">
+                <a16:creationId xmlns:a16="http://schemas.microsoft.com/office/drawing/2014/main" id="{98DF2DD2-FB23-4D6D-9BA5-4D846A3FF95F}"/>
+              </a:ext>
+            </a:extLst>
+          </p:cNvPr>
+          <p:cNvSpPr>
+            <a:spLocks noGrp="1"/>
+          </p:cNvSpPr>
+          <p:nvPr>
+            <p:ph type="sldNum" sz="quarter" idx="12"/>
+          </p:nvPr>
+        </p:nvSpPr>
+        <p:spPr/>
+        <p:txBody>
+          <a:bodyPr/>
+          <a:lstStyle/>
+          <a:p>
+            <a:fld id="{5B64AE77-6BC1-49CA-AA73-E9D0D5F1D944}" type="slidenum">
+              <a:rPr lang="cs-CZ" smtClean="0"/>
+              <a:t>16</a:t>
+            </a:fld>
             <a:endParaRPr lang="cs-CZ" dirty="0"/>
           </a:p>
         </p:txBody>
@@ -8358,10 +8589,10 @@
       </p:sp>
       <p:sp>
         <p:nvSpPr>
-          <p:cNvPr id="5" name="Zástupný symbol pro datum 4">
-            <a:extLst>
-              <a:ext uri="{FF2B5EF4-FFF2-40B4-BE49-F238E27FC236}">
-                <a16:creationId xmlns:a16="http://schemas.microsoft.com/office/drawing/2014/main" id="{6C1119B5-5FBD-460F-961C-A5AD28BBAAA1}"/>
+          <p:cNvPr id="4" name="Zástupný symbol pro datum 3">
+            <a:extLst>
+              <a:ext uri="{FF2B5EF4-FFF2-40B4-BE49-F238E27FC236}">
+                <a16:creationId xmlns:a16="http://schemas.microsoft.com/office/drawing/2014/main" id="{A9931BE1-2A95-41F9-A7A4-D5BD5881F439}"/>
               </a:ext>
             </a:extLst>
           </p:cNvPr>
@@ -8387,10 +8618,10 @@
       </p:sp>
       <p:sp>
         <p:nvSpPr>
-          <p:cNvPr id="6" name="Zástupný symbol pro zápatí 5">
-            <a:extLst>
-              <a:ext uri="{FF2B5EF4-FFF2-40B4-BE49-F238E27FC236}">
-                <a16:creationId xmlns:a16="http://schemas.microsoft.com/office/drawing/2014/main" id="{DE52B87F-1A01-42C3-96A1-95984A631472}"/>
+          <p:cNvPr id="11" name="Zástupný symbol pro zápatí 10">
+            <a:extLst>
+              <a:ext uri="{FF2B5EF4-FFF2-40B4-BE49-F238E27FC236}">
+                <a16:creationId xmlns:a16="http://schemas.microsoft.com/office/drawing/2014/main" id="{C1C8BBE7-5AE1-4D57-B50B-7762D3C863A0}"/>
               </a:ext>
             </a:extLst>
           </p:cNvPr>
@@ -8410,6 +8641,35 @@
               <a:rPr lang="en-US"/>
               <a:t>Using Microsoft Word for preparing XML TEI-compliant digital editions</a:t>
             </a:r>
+            <a:endParaRPr lang="cs-CZ" dirty="0"/>
+          </a:p>
+        </p:txBody>
+      </p:sp>
+      <p:sp>
+        <p:nvSpPr>
+          <p:cNvPr id="12" name="Zástupný symbol pro číslo snímku 11">
+            <a:extLst>
+              <a:ext uri="{FF2B5EF4-FFF2-40B4-BE49-F238E27FC236}">
+                <a16:creationId xmlns:a16="http://schemas.microsoft.com/office/drawing/2014/main" id="{D93A28DB-7DFD-49A1-8826-346C5ADDA9F5}"/>
+              </a:ext>
+            </a:extLst>
+          </p:cNvPr>
+          <p:cNvSpPr>
+            <a:spLocks noGrp="1"/>
+          </p:cNvSpPr>
+          <p:nvPr>
+            <p:ph type="sldNum" sz="quarter" idx="12"/>
+          </p:nvPr>
+        </p:nvSpPr>
+        <p:spPr/>
+        <p:txBody>
+          <a:bodyPr/>
+          <a:lstStyle/>
+          <a:p>
+            <a:fld id="{5B64AE77-6BC1-49CA-AA73-E9D0D5F1D944}" type="slidenum">
+              <a:rPr lang="cs-CZ" smtClean="0"/>
+              <a:t>17</a:t>
+            </a:fld>
             <a:endParaRPr lang="cs-CZ" dirty="0"/>
           </a:p>
         </p:txBody>
@@ -9553,10 +9813,10 @@
       </p:sp>
       <p:sp>
         <p:nvSpPr>
-          <p:cNvPr id="4" name="Zástupný symbol pro datum 3">
-            <a:extLst>
-              <a:ext uri="{FF2B5EF4-FFF2-40B4-BE49-F238E27FC236}">
-                <a16:creationId xmlns:a16="http://schemas.microsoft.com/office/drawing/2014/main" id="{466CCDE8-B680-4A7E-9E8C-FC7AEF7CDE98}"/>
+          <p:cNvPr id="8" name="Zástupný symbol pro datum 7">
+            <a:extLst>
+              <a:ext uri="{FF2B5EF4-FFF2-40B4-BE49-F238E27FC236}">
+                <a16:creationId xmlns:a16="http://schemas.microsoft.com/office/drawing/2014/main" id="{17669253-99B3-4532-B20F-8EF6A2AC6EB1}"/>
               </a:ext>
             </a:extLst>
           </p:cNvPr>
@@ -9582,10 +9842,10 @@
       </p:sp>
       <p:sp>
         <p:nvSpPr>
-          <p:cNvPr id="5" name="Zástupný symbol pro zápatí 4">
-            <a:extLst>
-              <a:ext uri="{FF2B5EF4-FFF2-40B4-BE49-F238E27FC236}">
-                <a16:creationId xmlns:a16="http://schemas.microsoft.com/office/drawing/2014/main" id="{B5C89831-CFAC-4327-A4C4-021DF3C86953}"/>
+          <p:cNvPr id="9" name="Zástupný symbol pro zápatí 8">
+            <a:extLst>
+              <a:ext uri="{FF2B5EF4-FFF2-40B4-BE49-F238E27FC236}">
+                <a16:creationId xmlns:a16="http://schemas.microsoft.com/office/drawing/2014/main" id="{67F5CA2E-445E-4CD9-977D-8607260E78BE}"/>
               </a:ext>
             </a:extLst>
           </p:cNvPr>
@@ -9602,9 +9862,38 @@
           <a:lstStyle/>
           <a:p>
             <a:r>
-              <a:rPr lang="en-US" dirty="0"/>
+              <a:rPr lang="en-US"/>
               <a:t>Using Microsoft Word for preparing XML TEI-compliant digital editions</a:t>
             </a:r>
+            <a:endParaRPr lang="cs-CZ" dirty="0"/>
+          </a:p>
+        </p:txBody>
+      </p:sp>
+      <p:sp>
+        <p:nvSpPr>
+          <p:cNvPr id="10" name="Zástupný symbol pro číslo snímku 9">
+            <a:extLst>
+              <a:ext uri="{FF2B5EF4-FFF2-40B4-BE49-F238E27FC236}">
+                <a16:creationId xmlns:a16="http://schemas.microsoft.com/office/drawing/2014/main" id="{EF95DE61-3F4E-473E-B345-57CEEBBECDC4}"/>
+              </a:ext>
+            </a:extLst>
+          </p:cNvPr>
+          <p:cNvSpPr>
+            <a:spLocks noGrp="1"/>
+          </p:cNvSpPr>
+          <p:nvPr>
+            <p:ph type="sldNum" sz="quarter" idx="12"/>
+          </p:nvPr>
+        </p:nvSpPr>
+        <p:spPr/>
+        <p:txBody>
+          <a:bodyPr/>
+          <a:lstStyle/>
+          <a:p>
+            <a:fld id="{5B64AE77-6BC1-49CA-AA73-E9D0D5F1D944}" type="slidenum">
+              <a:rPr lang="cs-CZ" smtClean="0"/>
+              <a:t>18</a:t>
+            </a:fld>
             <a:endParaRPr lang="cs-CZ" dirty="0"/>
           </a:p>
         </p:txBody>
@@ -10155,10 +10444,10 @@
       </p:sp>
       <p:sp>
         <p:nvSpPr>
-          <p:cNvPr id="4" name="Zástupný symbol pro datum 3">
-            <a:extLst>
-              <a:ext uri="{FF2B5EF4-FFF2-40B4-BE49-F238E27FC236}">
-                <a16:creationId xmlns:a16="http://schemas.microsoft.com/office/drawing/2014/main" id="{A8FCFE49-9696-40DF-8DDD-C0B8A0BAD1BB}"/>
+          <p:cNvPr id="6" name="Zástupný symbol pro datum 5">
+            <a:extLst>
+              <a:ext uri="{FF2B5EF4-FFF2-40B4-BE49-F238E27FC236}">
+                <a16:creationId xmlns:a16="http://schemas.microsoft.com/office/drawing/2014/main" id="{3F438FF7-257E-4A70-9E40-34AAEBEE158B}"/>
               </a:ext>
             </a:extLst>
           </p:cNvPr>
@@ -10184,10 +10473,10 @@
       </p:sp>
       <p:sp>
         <p:nvSpPr>
-          <p:cNvPr id="5" name="Zástupný symbol pro zápatí 4">
-            <a:extLst>
-              <a:ext uri="{FF2B5EF4-FFF2-40B4-BE49-F238E27FC236}">
-                <a16:creationId xmlns:a16="http://schemas.microsoft.com/office/drawing/2014/main" id="{68A6A911-2726-44BA-9AF5-72747163D754}"/>
+          <p:cNvPr id="11" name="Zástupný symbol pro zápatí 10">
+            <a:extLst>
+              <a:ext uri="{FF2B5EF4-FFF2-40B4-BE49-F238E27FC236}">
+                <a16:creationId xmlns:a16="http://schemas.microsoft.com/office/drawing/2014/main" id="{3BAAC9CD-E22B-4183-A630-F58329B785B6}"/>
               </a:ext>
             </a:extLst>
           </p:cNvPr>
@@ -10207,6 +10496,35 @@
               <a:rPr lang="en-US"/>
               <a:t>Using Microsoft Word for preparing XML TEI-compliant digital editions</a:t>
             </a:r>
+            <a:endParaRPr lang="cs-CZ" dirty="0"/>
+          </a:p>
+        </p:txBody>
+      </p:sp>
+      <p:sp>
+        <p:nvSpPr>
+          <p:cNvPr id="12" name="Zástupný symbol pro číslo snímku 11">
+            <a:extLst>
+              <a:ext uri="{FF2B5EF4-FFF2-40B4-BE49-F238E27FC236}">
+                <a16:creationId xmlns:a16="http://schemas.microsoft.com/office/drawing/2014/main" id="{964AB569-EAEE-41C8-BED0-2C5F87A8FD92}"/>
+              </a:ext>
+            </a:extLst>
+          </p:cNvPr>
+          <p:cNvSpPr>
+            <a:spLocks noGrp="1"/>
+          </p:cNvSpPr>
+          <p:nvPr>
+            <p:ph type="sldNum" sz="quarter" idx="12"/>
+          </p:nvPr>
+        </p:nvSpPr>
+        <p:spPr/>
+        <p:txBody>
+          <a:bodyPr/>
+          <a:lstStyle/>
+          <a:p>
+            <a:fld id="{5B64AE77-6BC1-49CA-AA73-E9D0D5F1D944}" type="slidenum">
+              <a:rPr lang="cs-CZ" smtClean="0"/>
+              <a:t>19</a:t>
+            </a:fld>
             <a:endParaRPr lang="cs-CZ" dirty="0"/>
           </a:p>
         </p:txBody>
@@ -10554,10 +10872,10 @@
       </p:sp>
       <p:sp>
         <p:nvSpPr>
-          <p:cNvPr id="4" name="Zástupný symbol pro datum 3">
-            <a:extLst>
-              <a:ext uri="{FF2B5EF4-FFF2-40B4-BE49-F238E27FC236}">
-                <a16:creationId xmlns:a16="http://schemas.microsoft.com/office/drawing/2014/main" id="{FDE3505E-4C67-4675-B3C8-8BA1A964904B}"/>
+          <p:cNvPr id="8" name="Zástupný symbol pro datum 7">
+            <a:extLst>
+              <a:ext uri="{FF2B5EF4-FFF2-40B4-BE49-F238E27FC236}">
+                <a16:creationId xmlns:a16="http://schemas.microsoft.com/office/drawing/2014/main" id="{74B26F02-D5D2-4694-A2DC-D64A031787D1}"/>
               </a:ext>
             </a:extLst>
           </p:cNvPr>
@@ -10583,10 +10901,10 @@
       </p:sp>
       <p:sp>
         <p:nvSpPr>
-          <p:cNvPr id="5" name="Zástupný symbol pro zápatí 4">
-            <a:extLst>
-              <a:ext uri="{FF2B5EF4-FFF2-40B4-BE49-F238E27FC236}">
-                <a16:creationId xmlns:a16="http://schemas.microsoft.com/office/drawing/2014/main" id="{BC1CC8C1-D0CC-4A6F-AF8F-EB9808CDEA35}"/>
+          <p:cNvPr id="9" name="Zástupný symbol pro zápatí 8">
+            <a:extLst>
+              <a:ext uri="{FF2B5EF4-FFF2-40B4-BE49-F238E27FC236}">
+                <a16:creationId xmlns:a16="http://schemas.microsoft.com/office/drawing/2014/main" id="{FE87787F-2449-493E-9BD9-B19A91B81A0B}"/>
               </a:ext>
             </a:extLst>
           </p:cNvPr>
@@ -10606,6 +10924,35 @@
               <a:rPr lang="en-US"/>
               <a:t>Using Microsoft Word for preparing XML TEI-compliant digital editions</a:t>
             </a:r>
+            <a:endParaRPr lang="cs-CZ" dirty="0"/>
+          </a:p>
+        </p:txBody>
+      </p:sp>
+      <p:sp>
+        <p:nvSpPr>
+          <p:cNvPr id="10" name="Zástupný symbol pro číslo snímku 9">
+            <a:extLst>
+              <a:ext uri="{FF2B5EF4-FFF2-40B4-BE49-F238E27FC236}">
+                <a16:creationId xmlns:a16="http://schemas.microsoft.com/office/drawing/2014/main" id="{E276FEA6-179D-4AE0-BACB-AB4F9B7E4E05}"/>
+              </a:ext>
+            </a:extLst>
+          </p:cNvPr>
+          <p:cNvSpPr>
+            <a:spLocks noGrp="1"/>
+          </p:cNvSpPr>
+          <p:nvPr>
+            <p:ph type="sldNum" sz="quarter" idx="12"/>
+          </p:nvPr>
+        </p:nvSpPr>
+        <p:spPr/>
+        <p:txBody>
+          <a:bodyPr/>
+          <a:lstStyle/>
+          <a:p>
+            <a:fld id="{5B64AE77-6BC1-49CA-AA73-E9D0D5F1D944}" type="slidenum">
+              <a:rPr lang="cs-CZ" smtClean="0"/>
+              <a:t>2</a:t>
+            </a:fld>
             <a:endParaRPr lang="cs-CZ" dirty="0"/>
           </a:p>
         </p:txBody>
@@ -10871,10 +11218,10 @@
       </p:sp>
       <p:sp>
         <p:nvSpPr>
-          <p:cNvPr id="4" name="Zástupný symbol pro datum 3">
-            <a:extLst>
-              <a:ext uri="{FF2B5EF4-FFF2-40B4-BE49-F238E27FC236}">
-                <a16:creationId xmlns:a16="http://schemas.microsoft.com/office/drawing/2014/main" id="{B33A0B83-2A75-447C-AC5C-1AEE31AF05A6}"/>
+          <p:cNvPr id="7" name="Zástupný symbol pro datum 6">
+            <a:extLst>
+              <a:ext uri="{FF2B5EF4-FFF2-40B4-BE49-F238E27FC236}">
+                <a16:creationId xmlns:a16="http://schemas.microsoft.com/office/drawing/2014/main" id="{B501F666-6D05-4364-ADB9-F2EFFCCFE96B}"/>
               </a:ext>
             </a:extLst>
           </p:cNvPr>
@@ -10900,10 +11247,10 @@
       </p:sp>
       <p:sp>
         <p:nvSpPr>
-          <p:cNvPr id="5" name="Zástupný symbol pro zápatí 4">
-            <a:extLst>
-              <a:ext uri="{FF2B5EF4-FFF2-40B4-BE49-F238E27FC236}">
-                <a16:creationId xmlns:a16="http://schemas.microsoft.com/office/drawing/2014/main" id="{E58E8CCE-A406-4EE0-9A09-CE00F23ED0BD}"/>
+          <p:cNvPr id="11" name="Zástupný symbol pro zápatí 10">
+            <a:extLst>
+              <a:ext uri="{FF2B5EF4-FFF2-40B4-BE49-F238E27FC236}">
+                <a16:creationId xmlns:a16="http://schemas.microsoft.com/office/drawing/2014/main" id="{EC580CA5-6195-47C6-AC40-C91DEEAE79D2}"/>
               </a:ext>
             </a:extLst>
           </p:cNvPr>
@@ -10923,6 +11270,35 @@
               <a:rPr lang="en-US"/>
               <a:t>Using Microsoft Word for preparing XML TEI-compliant digital editions</a:t>
             </a:r>
+            <a:endParaRPr lang="cs-CZ" dirty="0"/>
+          </a:p>
+        </p:txBody>
+      </p:sp>
+      <p:sp>
+        <p:nvSpPr>
+          <p:cNvPr id="12" name="Zástupný symbol pro číslo snímku 11">
+            <a:extLst>
+              <a:ext uri="{FF2B5EF4-FFF2-40B4-BE49-F238E27FC236}">
+                <a16:creationId xmlns:a16="http://schemas.microsoft.com/office/drawing/2014/main" id="{937CC770-E3B4-44D6-8D4F-72F53C59240E}"/>
+              </a:ext>
+            </a:extLst>
+          </p:cNvPr>
+          <p:cNvSpPr>
+            <a:spLocks noGrp="1"/>
+          </p:cNvSpPr>
+          <p:nvPr>
+            <p:ph type="sldNum" sz="quarter" idx="12"/>
+          </p:nvPr>
+        </p:nvSpPr>
+        <p:spPr/>
+        <p:txBody>
+          <a:bodyPr/>
+          <a:lstStyle/>
+          <a:p>
+            <a:fld id="{5B64AE77-6BC1-49CA-AA73-E9D0D5F1D944}" type="slidenum">
+              <a:rPr lang="cs-CZ" smtClean="0"/>
+              <a:t>20</a:t>
+            </a:fld>
             <a:endParaRPr lang="cs-CZ" dirty="0"/>
           </a:p>
         </p:txBody>
@@ -11074,10 +11450,10 @@
       </p:sp>
       <p:sp>
         <p:nvSpPr>
-          <p:cNvPr id="7" name="Zástupný symbol pro datum 6">
-            <a:extLst>
-              <a:ext uri="{FF2B5EF4-FFF2-40B4-BE49-F238E27FC236}">
-                <a16:creationId xmlns:a16="http://schemas.microsoft.com/office/drawing/2014/main" id="{5FC0C4E3-58E2-4AFC-BA3B-DA76A8D59FCA}"/>
+          <p:cNvPr id="3" name="Zástupný symbol pro datum 2">
+            <a:extLst>
+              <a:ext uri="{FF2B5EF4-FFF2-40B4-BE49-F238E27FC236}">
+                <a16:creationId xmlns:a16="http://schemas.microsoft.com/office/drawing/2014/main" id="{10AE407C-CFF7-4F3E-83A7-38F720B877A6}"/>
               </a:ext>
             </a:extLst>
           </p:cNvPr>
@@ -11103,10 +11479,10 @@
       </p:sp>
       <p:sp>
         <p:nvSpPr>
-          <p:cNvPr id="8" name="Zástupný symbol pro zápatí 7">
-            <a:extLst>
-              <a:ext uri="{FF2B5EF4-FFF2-40B4-BE49-F238E27FC236}">
-                <a16:creationId xmlns:a16="http://schemas.microsoft.com/office/drawing/2014/main" id="{E0FF5E3A-D087-44BF-9AC4-8F22EA32A9E3}"/>
+          <p:cNvPr id="4" name="Zástupný symbol pro zápatí 3">
+            <a:extLst>
+              <a:ext uri="{FF2B5EF4-FFF2-40B4-BE49-F238E27FC236}">
+                <a16:creationId xmlns:a16="http://schemas.microsoft.com/office/drawing/2014/main" id="{A1C17341-4EAB-4206-B5EB-2B55297B6643}"/>
               </a:ext>
             </a:extLst>
           </p:cNvPr>
@@ -11126,6 +11502,35 @@
               <a:rPr lang="en-US"/>
               <a:t>Using Microsoft Word for preparing XML TEI-compliant digital editions</a:t>
             </a:r>
+            <a:endParaRPr lang="cs-CZ" dirty="0"/>
+          </a:p>
+        </p:txBody>
+      </p:sp>
+      <p:sp>
+        <p:nvSpPr>
+          <p:cNvPr id="5" name="Zástupný symbol pro číslo snímku 4">
+            <a:extLst>
+              <a:ext uri="{FF2B5EF4-FFF2-40B4-BE49-F238E27FC236}">
+                <a16:creationId xmlns:a16="http://schemas.microsoft.com/office/drawing/2014/main" id="{1AB2B336-4443-4BC2-8300-A7582E78117D}"/>
+              </a:ext>
+            </a:extLst>
+          </p:cNvPr>
+          <p:cNvSpPr>
+            <a:spLocks noGrp="1"/>
+          </p:cNvSpPr>
+          <p:nvPr>
+            <p:ph type="sldNum" sz="quarter" idx="12"/>
+          </p:nvPr>
+        </p:nvSpPr>
+        <p:spPr/>
+        <p:txBody>
+          <a:bodyPr/>
+          <a:lstStyle/>
+          <a:p>
+            <a:fld id="{5B64AE77-6BC1-49CA-AA73-E9D0D5F1D944}" type="slidenum">
+              <a:rPr lang="cs-CZ" smtClean="0"/>
+              <a:t>21</a:t>
+            </a:fld>
             <a:endParaRPr lang="cs-CZ" dirty="0"/>
           </a:p>
         </p:txBody>
@@ -11359,10 +11764,10 @@
       </p:sp>
       <p:sp>
         <p:nvSpPr>
-          <p:cNvPr id="4" name="Zástupný symbol pro datum 3">
-            <a:extLst>
-              <a:ext uri="{FF2B5EF4-FFF2-40B4-BE49-F238E27FC236}">
-                <a16:creationId xmlns:a16="http://schemas.microsoft.com/office/drawing/2014/main" id="{D47408FB-5B59-4700-BCFB-E0D7D57BB968}"/>
+          <p:cNvPr id="7" name="Zástupný symbol pro datum 6">
+            <a:extLst>
+              <a:ext uri="{FF2B5EF4-FFF2-40B4-BE49-F238E27FC236}">
+                <a16:creationId xmlns:a16="http://schemas.microsoft.com/office/drawing/2014/main" id="{64309340-77C9-4826-B5E3-F18461F03B24}"/>
               </a:ext>
             </a:extLst>
           </p:cNvPr>
@@ -11388,10 +11793,10 @@
       </p:sp>
       <p:sp>
         <p:nvSpPr>
-          <p:cNvPr id="5" name="Zástupný symbol pro zápatí 4">
-            <a:extLst>
-              <a:ext uri="{FF2B5EF4-FFF2-40B4-BE49-F238E27FC236}">
-                <a16:creationId xmlns:a16="http://schemas.microsoft.com/office/drawing/2014/main" id="{FA86D689-3B8C-4CE6-A02F-D86A24C8BD37}"/>
+          <p:cNvPr id="8" name="Zástupný symbol pro zápatí 7">
+            <a:extLst>
+              <a:ext uri="{FF2B5EF4-FFF2-40B4-BE49-F238E27FC236}">
+                <a16:creationId xmlns:a16="http://schemas.microsoft.com/office/drawing/2014/main" id="{504C8198-4A6B-4684-A9F0-1E465DCAB747}"/>
               </a:ext>
             </a:extLst>
           </p:cNvPr>
@@ -11411,6 +11816,35 @@
               <a:rPr lang="en-US"/>
               <a:t>Using Microsoft Word for preparing XML TEI-compliant digital editions</a:t>
             </a:r>
+            <a:endParaRPr lang="cs-CZ" dirty="0"/>
+          </a:p>
+        </p:txBody>
+      </p:sp>
+      <p:sp>
+        <p:nvSpPr>
+          <p:cNvPr id="9" name="Zástupný symbol pro číslo snímku 8">
+            <a:extLst>
+              <a:ext uri="{FF2B5EF4-FFF2-40B4-BE49-F238E27FC236}">
+                <a16:creationId xmlns:a16="http://schemas.microsoft.com/office/drawing/2014/main" id="{DD4D419A-E715-4A05-A82C-86FC0A83E2D3}"/>
+              </a:ext>
+            </a:extLst>
+          </p:cNvPr>
+          <p:cNvSpPr>
+            <a:spLocks noGrp="1"/>
+          </p:cNvSpPr>
+          <p:nvPr>
+            <p:ph type="sldNum" sz="quarter" idx="12"/>
+          </p:nvPr>
+        </p:nvSpPr>
+        <p:spPr/>
+        <p:txBody>
+          <a:bodyPr/>
+          <a:lstStyle/>
+          <a:p>
+            <a:fld id="{5B64AE77-6BC1-49CA-AA73-E9D0D5F1D944}" type="slidenum">
+              <a:rPr lang="cs-CZ" smtClean="0"/>
+              <a:t>3</a:t>
+            </a:fld>
             <a:endParaRPr lang="cs-CZ" dirty="0"/>
           </a:p>
         </p:txBody>
@@ -11518,10 +11952,10 @@
       </p:sp>
       <p:sp>
         <p:nvSpPr>
-          <p:cNvPr id="4" name="Zástupný symbol pro datum 3">
-            <a:extLst>
-              <a:ext uri="{FF2B5EF4-FFF2-40B4-BE49-F238E27FC236}">
-                <a16:creationId xmlns:a16="http://schemas.microsoft.com/office/drawing/2014/main" id="{FDFEC33B-9FCD-4FD8-A28F-4E33C564EC3E}"/>
+          <p:cNvPr id="7" name="Zástupný symbol pro datum 6">
+            <a:extLst>
+              <a:ext uri="{FF2B5EF4-FFF2-40B4-BE49-F238E27FC236}">
+                <a16:creationId xmlns:a16="http://schemas.microsoft.com/office/drawing/2014/main" id="{0515ECB8-0AF7-482C-B281-FC9451F08A40}"/>
               </a:ext>
             </a:extLst>
           </p:cNvPr>
@@ -11547,10 +11981,10 @@
       </p:sp>
       <p:sp>
         <p:nvSpPr>
-          <p:cNvPr id="5" name="Zástupný symbol pro zápatí 4">
-            <a:extLst>
-              <a:ext uri="{FF2B5EF4-FFF2-40B4-BE49-F238E27FC236}">
-                <a16:creationId xmlns:a16="http://schemas.microsoft.com/office/drawing/2014/main" id="{29111ACF-F693-48ED-A9D6-DBAF888BB849}"/>
+          <p:cNvPr id="8" name="Zástupný symbol pro zápatí 7">
+            <a:extLst>
+              <a:ext uri="{FF2B5EF4-FFF2-40B4-BE49-F238E27FC236}">
+                <a16:creationId xmlns:a16="http://schemas.microsoft.com/office/drawing/2014/main" id="{91174F35-AC65-4810-85B7-A5552F2C2A53}"/>
               </a:ext>
             </a:extLst>
           </p:cNvPr>
@@ -11570,6 +12004,35 @@
               <a:rPr lang="en-US"/>
               <a:t>Using Microsoft Word for preparing XML TEI-compliant digital editions</a:t>
             </a:r>
+            <a:endParaRPr lang="cs-CZ" dirty="0"/>
+          </a:p>
+        </p:txBody>
+      </p:sp>
+      <p:sp>
+        <p:nvSpPr>
+          <p:cNvPr id="9" name="Zástupný symbol pro číslo snímku 8">
+            <a:extLst>
+              <a:ext uri="{FF2B5EF4-FFF2-40B4-BE49-F238E27FC236}">
+                <a16:creationId xmlns:a16="http://schemas.microsoft.com/office/drawing/2014/main" id="{31212389-AA50-4631-94E5-0D7A4F619D0B}"/>
+              </a:ext>
+            </a:extLst>
+          </p:cNvPr>
+          <p:cNvSpPr>
+            <a:spLocks noGrp="1"/>
+          </p:cNvSpPr>
+          <p:nvPr>
+            <p:ph type="sldNum" sz="quarter" idx="12"/>
+          </p:nvPr>
+        </p:nvSpPr>
+        <p:spPr/>
+        <p:txBody>
+          <a:bodyPr/>
+          <a:lstStyle/>
+          <a:p>
+            <a:fld id="{5B64AE77-6BC1-49CA-AA73-E9D0D5F1D944}" type="slidenum">
+              <a:rPr lang="cs-CZ" smtClean="0"/>
+              <a:t>4</a:t>
+            </a:fld>
             <a:endParaRPr lang="cs-CZ" dirty="0"/>
           </a:p>
         </p:txBody>
@@ -11604,64 +12067,6 @@
           <a:chExt cx="0" cy="0"/>
         </a:xfrm>
       </p:grpSpPr>
-      <p:sp>
-        <p:nvSpPr>
-          <p:cNvPr id="4" name="Zástupný symbol pro datum 3">
-            <a:extLst>
-              <a:ext uri="{FF2B5EF4-FFF2-40B4-BE49-F238E27FC236}">
-                <a16:creationId xmlns:a16="http://schemas.microsoft.com/office/drawing/2014/main" id="{165C4A51-4F9D-4EB4-B78A-AB4AAB265CBC}"/>
-              </a:ext>
-            </a:extLst>
-          </p:cNvPr>
-          <p:cNvSpPr>
-            <a:spLocks noGrp="1"/>
-          </p:cNvSpPr>
-          <p:nvPr>
-            <p:ph type="dt" sz="half" idx="10"/>
-          </p:nvPr>
-        </p:nvSpPr>
-        <p:spPr/>
-        <p:txBody>
-          <a:bodyPr/>
-          <a:lstStyle/>
-          <a:p>
-            <a:r>
-              <a:rPr lang="cs-CZ"/>
-              <a:t>TEI 2019, Graz, 2019-09-20</a:t>
-            </a:r>
-            <a:endParaRPr lang="cs-CZ" dirty="0"/>
-          </a:p>
-        </p:txBody>
-      </p:sp>
-      <p:sp>
-        <p:nvSpPr>
-          <p:cNvPr id="5" name="Zástupný symbol pro zápatí 4">
-            <a:extLst>
-              <a:ext uri="{FF2B5EF4-FFF2-40B4-BE49-F238E27FC236}">
-                <a16:creationId xmlns:a16="http://schemas.microsoft.com/office/drawing/2014/main" id="{C013ED42-2242-40F1-B743-E995F01D8899}"/>
-              </a:ext>
-            </a:extLst>
-          </p:cNvPr>
-          <p:cNvSpPr>
-            <a:spLocks noGrp="1"/>
-          </p:cNvSpPr>
-          <p:nvPr>
-            <p:ph type="ftr" sz="quarter" idx="11"/>
-          </p:nvPr>
-        </p:nvSpPr>
-        <p:spPr/>
-        <p:txBody>
-          <a:bodyPr/>
-          <a:lstStyle/>
-          <a:p>
-            <a:r>
-              <a:rPr lang="en-US"/>
-              <a:t>Using Microsoft Word for preparing XML TEI-compliant digital editions</a:t>
-            </a:r>
-            <a:endParaRPr lang="cs-CZ" dirty="0"/>
-          </a:p>
-        </p:txBody>
-      </p:sp>
       <p:pic>
         <p:nvPicPr>
           <p:cNvPr id="8" name="Obrázek 7">
@@ -11698,6 +12103,93 @@
           </a:prstGeom>
         </p:spPr>
       </p:pic>
+      <p:sp>
+        <p:nvSpPr>
+          <p:cNvPr id="3" name="Zástupný symbol pro datum 2">
+            <a:extLst>
+              <a:ext uri="{FF2B5EF4-FFF2-40B4-BE49-F238E27FC236}">
+                <a16:creationId xmlns:a16="http://schemas.microsoft.com/office/drawing/2014/main" id="{6B642591-1924-445E-AC1B-8FF560A2C310}"/>
+              </a:ext>
+            </a:extLst>
+          </p:cNvPr>
+          <p:cNvSpPr>
+            <a:spLocks noGrp="1"/>
+          </p:cNvSpPr>
+          <p:nvPr>
+            <p:ph type="dt" sz="half" idx="10"/>
+          </p:nvPr>
+        </p:nvSpPr>
+        <p:spPr/>
+        <p:txBody>
+          <a:bodyPr/>
+          <a:lstStyle/>
+          <a:p>
+            <a:r>
+              <a:rPr lang="cs-CZ"/>
+              <a:t>TEI 2019, Graz, 2019-09-20</a:t>
+            </a:r>
+            <a:endParaRPr lang="cs-CZ" dirty="0"/>
+          </a:p>
+        </p:txBody>
+      </p:sp>
+      <p:sp>
+        <p:nvSpPr>
+          <p:cNvPr id="6" name="Zástupný symbol pro zápatí 5">
+            <a:extLst>
+              <a:ext uri="{FF2B5EF4-FFF2-40B4-BE49-F238E27FC236}">
+                <a16:creationId xmlns:a16="http://schemas.microsoft.com/office/drawing/2014/main" id="{F681BC33-23C1-4C81-A8FF-A87A40C6D8C9}"/>
+              </a:ext>
+            </a:extLst>
+          </p:cNvPr>
+          <p:cNvSpPr>
+            <a:spLocks noGrp="1"/>
+          </p:cNvSpPr>
+          <p:nvPr>
+            <p:ph type="ftr" sz="quarter" idx="11"/>
+          </p:nvPr>
+        </p:nvSpPr>
+        <p:spPr/>
+        <p:txBody>
+          <a:bodyPr/>
+          <a:lstStyle/>
+          <a:p>
+            <a:r>
+              <a:rPr lang="en-US"/>
+              <a:t>Using Microsoft Word for preparing XML TEI-compliant digital editions</a:t>
+            </a:r>
+            <a:endParaRPr lang="cs-CZ" dirty="0"/>
+          </a:p>
+        </p:txBody>
+      </p:sp>
+      <p:sp>
+        <p:nvSpPr>
+          <p:cNvPr id="7" name="Zástupný symbol pro číslo snímku 6">
+            <a:extLst>
+              <a:ext uri="{FF2B5EF4-FFF2-40B4-BE49-F238E27FC236}">
+                <a16:creationId xmlns:a16="http://schemas.microsoft.com/office/drawing/2014/main" id="{38473EE8-E73B-4B7C-894C-F3C086A73CE9}"/>
+              </a:ext>
+            </a:extLst>
+          </p:cNvPr>
+          <p:cNvSpPr>
+            <a:spLocks noGrp="1"/>
+          </p:cNvSpPr>
+          <p:nvPr>
+            <p:ph type="sldNum" sz="quarter" idx="12"/>
+          </p:nvPr>
+        </p:nvSpPr>
+        <p:spPr/>
+        <p:txBody>
+          <a:bodyPr/>
+          <a:lstStyle/>
+          <a:p>
+            <a:fld id="{5B64AE77-6BC1-49CA-AA73-E9D0D5F1D944}" type="slidenum">
+              <a:rPr lang="cs-CZ" smtClean="0"/>
+              <a:t>5</a:t>
+            </a:fld>
+            <a:endParaRPr lang="cs-CZ" dirty="0"/>
+          </a:p>
+        </p:txBody>
+      </p:sp>
     </p:spTree>
     <p:extLst>
       <p:ext uri="{BB962C8B-B14F-4D97-AF65-F5344CB8AC3E}">
@@ -11778,51 +12270,66 @@
           <a:lstStyle/>
           <a:p>
             <a:r>
-              <a:rPr lang="en-US"/>
+              <a:rPr lang="en-US" dirty="0"/>
               <a:t>info table with metadata</a:t>
             </a:r>
           </a:p>
           <a:p>
             <a:pPr lvl="1"/>
             <a:r>
-              <a:rPr lang="en-US"/>
+              <a:rPr lang="en-US" dirty="0"/>
               <a:t>title, author, location of the manuscript, editor</a:t>
             </a:r>
           </a:p>
           <a:p>
             <a:r>
-              <a:rPr lang="en-US"/>
+              <a:rPr lang="en-US" dirty="0"/>
               <a:t>paragraph styles</a:t>
             </a:r>
+            <a:r>
+              <a:rPr lang="cs-CZ" dirty="0"/>
+              <a:t> (22)</a:t>
+            </a:r>
+            <a:endParaRPr lang="en-US" dirty="0"/>
           </a:p>
           <a:p>
             <a:pPr lvl="1"/>
             <a:r>
-              <a:rPr lang="en-US"/>
+              <a:rPr lang="en-US" dirty="0"/>
               <a:t>title, heading, subheading, paragraph, index item etc.</a:t>
             </a:r>
           </a:p>
           <a:p>
             <a:r>
-              <a:rPr lang="en-US"/>
+              <a:rPr lang="en-US" dirty="0"/>
               <a:t>character styles</a:t>
             </a:r>
+            <a:r>
+              <a:rPr lang="cs-CZ" dirty="0"/>
+              <a:t> (80)</a:t>
+            </a:r>
+            <a:endParaRPr lang="en-US" dirty="0"/>
           </a:p>
           <a:p>
             <a:pPr lvl="1"/>
             <a:r>
-              <a:rPr lang="en-US"/>
-              <a:t>bold, italic, additions, notes, foreign text, regular form, lemma, hyperlemma</a:t>
-            </a:r>
-          </a:p>
-        </p:txBody>
-      </p:sp>
-      <p:sp>
-        <p:nvSpPr>
-          <p:cNvPr id="4" name="Zástupný symbol pro datum 3">
-            <a:extLst>
-              <a:ext uri="{FF2B5EF4-FFF2-40B4-BE49-F238E27FC236}">
-                <a16:creationId xmlns:a16="http://schemas.microsoft.com/office/drawing/2014/main" id="{FDFEC33B-9FCD-4FD8-A28F-4E33C564EC3E}"/>
+              <a:rPr lang="en-US" dirty="0"/>
+              <a:t>bold, italic, additions, notes, foreign text, regular form, lemma, </a:t>
+            </a:r>
+            <a:r>
+              <a:rPr lang="en-US" dirty="0" err="1"/>
+              <a:t>hyperlemma</a:t>
+            </a:r>
+            <a:endParaRPr lang="en-US" dirty="0"/>
+          </a:p>
+        </p:txBody>
+      </p:sp>
+      <p:sp>
+        <p:nvSpPr>
+          <p:cNvPr id="7" name="Zástupný symbol pro datum 6">
+            <a:extLst>
+              <a:ext uri="{FF2B5EF4-FFF2-40B4-BE49-F238E27FC236}">
+                <a16:creationId xmlns:a16="http://schemas.microsoft.com/office/drawing/2014/main" id="{45710AD6-7FD7-4607-BB51-5921ED2EEA79}"/>
               </a:ext>
             </a:extLst>
           </p:cNvPr>
@@ -11842,16 +12349,16 @@
               <a:rPr lang="cs-CZ"/>
               <a:t>TEI 2019, Graz, 2019-09-20</a:t>
             </a:r>
-            <a:endParaRPr lang="en-US"/>
-          </a:p>
-        </p:txBody>
-      </p:sp>
-      <p:sp>
-        <p:nvSpPr>
-          <p:cNvPr id="5" name="Zástupný symbol pro zápatí 4">
-            <a:extLst>
-              <a:ext uri="{FF2B5EF4-FFF2-40B4-BE49-F238E27FC236}">
-                <a16:creationId xmlns:a16="http://schemas.microsoft.com/office/drawing/2014/main" id="{29111ACF-F693-48ED-A9D6-DBAF888BB849}"/>
+            <a:endParaRPr lang="cs-CZ" dirty="0"/>
+          </a:p>
+        </p:txBody>
+      </p:sp>
+      <p:sp>
+        <p:nvSpPr>
+          <p:cNvPr id="8" name="Zástupný symbol pro zápatí 7">
+            <a:extLst>
+              <a:ext uri="{FF2B5EF4-FFF2-40B4-BE49-F238E27FC236}">
+                <a16:creationId xmlns:a16="http://schemas.microsoft.com/office/drawing/2014/main" id="{B5FE0F71-3546-4AC1-8529-D34AA3796421}"/>
               </a:ext>
             </a:extLst>
           </p:cNvPr>
@@ -11871,6 +12378,36 @@
               <a:rPr lang="en-US"/>
               <a:t>Using Microsoft Word for preparing XML TEI-compliant digital editions</a:t>
             </a:r>
+            <a:endParaRPr lang="cs-CZ" dirty="0"/>
+          </a:p>
+        </p:txBody>
+      </p:sp>
+      <p:sp>
+        <p:nvSpPr>
+          <p:cNvPr id="9" name="Zástupný symbol pro číslo snímku 8">
+            <a:extLst>
+              <a:ext uri="{FF2B5EF4-FFF2-40B4-BE49-F238E27FC236}">
+                <a16:creationId xmlns:a16="http://schemas.microsoft.com/office/drawing/2014/main" id="{698AE22D-6336-4381-8668-66AF74A2A4BC}"/>
+              </a:ext>
+            </a:extLst>
+          </p:cNvPr>
+          <p:cNvSpPr>
+            <a:spLocks noGrp="1"/>
+          </p:cNvSpPr>
+          <p:nvPr>
+            <p:ph type="sldNum" sz="quarter" idx="12"/>
+          </p:nvPr>
+        </p:nvSpPr>
+        <p:spPr/>
+        <p:txBody>
+          <a:bodyPr/>
+          <a:lstStyle/>
+          <a:p>
+            <a:fld id="{5B64AE77-6BC1-49CA-AA73-E9D0D5F1D944}" type="slidenum">
+              <a:rPr lang="cs-CZ" smtClean="0"/>
+              <a:t>6</a:t>
+            </a:fld>
+            <a:endParaRPr lang="cs-CZ" dirty="0"/>
           </a:p>
         </p:txBody>
       </p:sp>
@@ -11904,64 +12441,6 @@
           <a:chExt cx="0" cy="0"/>
         </a:xfrm>
       </p:grpSpPr>
-      <p:sp>
-        <p:nvSpPr>
-          <p:cNvPr id="2" name="Zástupný symbol pro datum 1">
-            <a:extLst>
-              <a:ext uri="{FF2B5EF4-FFF2-40B4-BE49-F238E27FC236}">
-                <a16:creationId xmlns:a16="http://schemas.microsoft.com/office/drawing/2014/main" id="{3FEFE2E9-CC70-4572-84E9-942B6B2EB2E3}"/>
-              </a:ext>
-            </a:extLst>
-          </p:cNvPr>
-          <p:cNvSpPr>
-            <a:spLocks noGrp="1"/>
-          </p:cNvSpPr>
-          <p:nvPr>
-            <p:ph type="dt" sz="half" idx="10"/>
-          </p:nvPr>
-        </p:nvSpPr>
-        <p:spPr/>
-        <p:txBody>
-          <a:bodyPr/>
-          <a:lstStyle/>
-          <a:p>
-            <a:r>
-              <a:rPr lang="cs-CZ"/>
-              <a:t>TEI 2019, Graz, 2019-09-20</a:t>
-            </a:r>
-            <a:endParaRPr lang="cs-CZ" dirty="0"/>
-          </a:p>
-        </p:txBody>
-      </p:sp>
-      <p:sp>
-        <p:nvSpPr>
-          <p:cNvPr id="3" name="Zástupný symbol pro zápatí 2">
-            <a:extLst>
-              <a:ext uri="{FF2B5EF4-FFF2-40B4-BE49-F238E27FC236}">
-                <a16:creationId xmlns:a16="http://schemas.microsoft.com/office/drawing/2014/main" id="{42029409-3D75-4F1C-B48B-9B57E63890D7}"/>
-              </a:ext>
-            </a:extLst>
-          </p:cNvPr>
-          <p:cNvSpPr>
-            <a:spLocks noGrp="1"/>
-          </p:cNvSpPr>
-          <p:nvPr>
-            <p:ph type="ftr" sz="quarter" idx="11"/>
-          </p:nvPr>
-        </p:nvSpPr>
-        <p:spPr/>
-        <p:txBody>
-          <a:bodyPr/>
-          <a:lstStyle/>
-          <a:p>
-            <a:r>
-              <a:rPr lang="en-US"/>
-              <a:t>Using Microsoft Word for preparing XML TEI-compliant digital editions</a:t>
-            </a:r>
-            <a:endParaRPr lang="cs-CZ" dirty="0"/>
-          </a:p>
-        </p:txBody>
-      </p:sp>
       <p:pic>
         <p:nvPicPr>
           <p:cNvPr id="5" name="Obrázek 4">
@@ -12604,6 +13083,93 @@
               </a:rPr>
               <a:t>&lt;p&gt;</a:t>
             </a:r>
+          </a:p>
+        </p:txBody>
+      </p:sp>
+      <p:sp>
+        <p:nvSpPr>
+          <p:cNvPr id="14" name="Zástupný symbol pro datum 13">
+            <a:extLst>
+              <a:ext uri="{FF2B5EF4-FFF2-40B4-BE49-F238E27FC236}">
+                <a16:creationId xmlns:a16="http://schemas.microsoft.com/office/drawing/2014/main" id="{A869C1F4-4DC1-4592-AF7A-D62E0EF9F2FD}"/>
+              </a:ext>
+            </a:extLst>
+          </p:cNvPr>
+          <p:cNvSpPr>
+            <a:spLocks noGrp="1"/>
+          </p:cNvSpPr>
+          <p:nvPr>
+            <p:ph type="dt" sz="half" idx="10"/>
+          </p:nvPr>
+        </p:nvSpPr>
+        <p:spPr/>
+        <p:txBody>
+          <a:bodyPr/>
+          <a:lstStyle/>
+          <a:p>
+            <a:r>
+              <a:rPr lang="cs-CZ"/>
+              <a:t>TEI 2019, Graz, 2019-09-20</a:t>
+            </a:r>
+            <a:endParaRPr lang="cs-CZ" dirty="0"/>
+          </a:p>
+        </p:txBody>
+      </p:sp>
+      <p:sp>
+        <p:nvSpPr>
+          <p:cNvPr id="16" name="Zástupný symbol pro zápatí 15">
+            <a:extLst>
+              <a:ext uri="{FF2B5EF4-FFF2-40B4-BE49-F238E27FC236}">
+                <a16:creationId xmlns:a16="http://schemas.microsoft.com/office/drawing/2014/main" id="{D93B12FF-4A14-4892-B443-923596FD3ABE}"/>
+              </a:ext>
+            </a:extLst>
+          </p:cNvPr>
+          <p:cNvSpPr>
+            <a:spLocks noGrp="1"/>
+          </p:cNvSpPr>
+          <p:nvPr>
+            <p:ph type="ftr" sz="quarter" idx="11"/>
+          </p:nvPr>
+        </p:nvSpPr>
+        <p:spPr/>
+        <p:txBody>
+          <a:bodyPr/>
+          <a:lstStyle/>
+          <a:p>
+            <a:r>
+              <a:rPr lang="en-US"/>
+              <a:t>Using Microsoft Word for preparing XML TEI-compliant digital editions</a:t>
+            </a:r>
+            <a:endParaRPr lang="cs-CZ" dirty="0"/>
+          </a:p>
+        </p:txBody>
+      </p:sp>
+      <p:sp>
+        <p:nvSpPr>
+          <p:cNvPr id="17" name="Zástupný symbol pro číslo snímku 16">
+            <a:extLst>
+              <a:ext uri="{FF2B5EF4-FFF2-40B4-BE49-F238E27FC236}">
+                <a16:creationId xmlns:a16="http://schemas.microsoft.com/office/drawing/2014/main" id="{E9C8491A-165E-49D7-94BC-61CB84B9904D}"/>
+              </a:ext>
+            </a:extLst>
+          </p:cNvPr>
+          <p:cNvSpPr>
+            <a:spLocks noGrp="1"/>
+          </p:cNvSpPr>
+          <p:nvPr>
+            <p:ph type="sldNum" sz="quarter" idx="12"/>
+          </p:nvPr>
+        </p:nvSpPr>
+        <p:spPr/>
+        <p:txBody>
+          <a:bodyPr/>
+          <a:lstStyle/>
+          <a:p>
+            <a:fld id="{5B64AE77-6BC1-49CA-AA73-E9D0D5F1D944}" type="slidenum">
+              <a:rPr lang="cs-CZ" smtClean="0"/>
+              <a:t>7</a:t>
+            </a:fld>
+            <a:endParaRPr lang="cs-CZ" dirty="0"/>
           </a:p>
         </p:txBody>
       </p:sp>
@@ -13463,10 +14029,10 @@
       </p:sp>
       <p:sp>
         <p:nvSpPr>
-          <p:cNvPr id="2" name="Zástupný symbol pro datum 1">
-            <a:extLst>
-              <a:ext uri="{FF2B5EF4-FFF2-40B4-BE49-F238E27FC236}">
-                <a16:creationId xmlns:a16="http://schemas.microsoft.com/office/drawing/2014/main" id="{A86A225D-A4ED-4493-94F7-A4EE672FFA74}"/>
+          <p:cNvPr id="7" name="Zástupný symbol pro datum 6">
+            <a:extLst>
+              <a:ext uri="{FF2B5EF4-FFF2-40B4-BE49-F238E27FC236}">
+                <a16:creationId xmlns:a16="http://schemas.microsoft.com/office/drawing/2014/main" id="{F1A1A1E3-EC63-4EF7-96B3-04A849A025BE}"/>
               </a:ext>
             </a:extLst>
           </p:cNvPr>
@@ -13486,16 +14052,16 @@
               <a:rPr lang="cs-CZ"/>
               <a:t>TEI 2019, Graz, 2019-09-20</a:t>
             </a:r>
-            <a:endParaRPr lang="en-US"/>
-          </a:p>
-        </p:txBody>
-      </p:sp>
-      <p:sp>
-        <p:nvSpPr>
-          <p:cNvPr id="3" name="Zástupný symbol pro zápatí 2">
-            <a:extLst>
-              <a:ext uri="{FF2B5EF4-FFF2-40B4-BE49-F238E27FC236}">
-                <a16:creationId xmlns:a16="http://schemas.microsoft.com/office/drawing/2014/main" id="{47011647-09F4-4D6C-885D-4C6178032D8B}"/>
+            <a:endParaRPr lang="cs-CZ" dirty="0"/>
+          </a:p>
+        </p:txBody>
+      </p:sp>
+      <p:sp>
+        <p:nvSpPr>
+          <p:cNvPr id="8" name="Zástupný symbol pro zápatí 7">
+            <a:extLst>
+              <a:ext uri="{FF2B5EF4-FFF2-40B4-BE49-F238E27FC236}">
+                <a16:creationId xmlns:a16="http://schemas.microsoft.com/office/drawing/2014/main" id="{ACE213BA-25A1-401B-AF72-9C308D6BD0A0}"/>
               </a:ext>
             </a:extLst>
           </p:cNvPr>
@@ -13515,6 +14081,36 @@
               <a:rPr lang="en-US"/>
               <a:t>Using Microsoft Word for preparing XML TEI-compliant digital editions</a:t>
             </a:r>
+            <a:endParaRPr lang="cs-CZ" dirty="0"/>
+          </a:p>
+        </p:txBody>
+      </p:sp>
+      <p:sp>
+        <p:nvSpPr>
+          <p:cNvPr id="9" name="Zástupný symbol pro číslo snímku 8">
+            <a:extLst>
+              <a:ext uri="{FF2B5EF4-FFF2-40B4-BE49-F238E27FC236}">
+                <a16:creationId xmlns:a16="http://schemas.microsoft.com/office/drawing/2014/main" id="{50C6997C-3106-4176-B698-EE6CBFC0D7DA}"/>
+              </a:ext>
+            </a:extLst>
+          </p:cNvPr>
+          <p:cNvSpPr>
+            <a:spLocks noGrp="1"/>
+          </p:cNvSpPr>
+          <p:nvPr>
+            <p:ph type="sldNum" sz="quarter" idx="12"/>
+          </p:nvPr>
+        </p:nvSpPr>
+        <p:spPr/>
+        <p:txBody>
+          <a:bodyPr/>
+          <a:lstStyle/>
+          <a:p>
+            <a:fld id="{5B64AE77-6BC1-49CA-AA73-E9D0D5F1D944}" type="slidenum">
+              <a:rPr lang="cs-CZ" smtClean="0"/>
+              <a:t>8</a:t>
+            </a:fld>
+            <a:endParaRPr lang="cs-CZ" dirty="0"/>
           </a:p>
         </p:txBody>
       </p:sp>
@@ -13548,64 +14144,6 @@
           <a:chExt cx="0" cy="0"/>
         </a:xfrm>
       </p:grpSpPr>
-      <p:sp>
-        <p:nvSpPr>
-          <p:cNvPr id="4" name="Zástupný symbol pro datum 3">
-            <a:extLst>
-              <a:ext uri="{FF2B5EF4-FFF2-40B4-BE49-F238E27FC236}">
-                <a16:creationId xmlns:a16="http://schemas.microsoft.com/office/drawing/2014/main" id="{B4CD853F-8ADD-4620-9459-F5DAF3B1202F}"/>
-              </a:ext>
-            </a:extLst>
-          </p:cNvPr>
-          <p:cNvSpPr>
-            <a:spLocks noGrp="1"/>
-          </p:cNvSpPr>
-          <p:nvPr>
-            <p:ph type="dt" sz="half" idx="10"/>
-          </p:nvPr>
-        </p:nvSpPr>
-        <p:spPr/>
-        <p:txBody>
-          <a:bodyPr/>
-          <a:lstStyle/>
-          <a:p>
-            <a:r>
-              <a:rPr lang="cs-CZ"/>
-              <a:t>TEI 2019, Graz, 2019-09-20</a:t>
-            </a:r>
-            <a:endParaRPr lang="cs-CZ" dirty="0"/>
-          </a:p>
-        </p:txBody>
-      </p:sp>
-      <p:sp>
-        <p:nvSpPr>
-          <p:cNvPr id="5" name="Zástupný symbol pro zápatí 4">
-            <a:extLst>
-              <a:ext uri="{FF2B5EF4-FFF2-40B4-BE49-F238E27FC236}">
-                <a16:creationId xmlns:a16="http://schemas.microsoft.com/office/drawing/2014/main" id="{24D93859-D0C0-43F4-B33C-02DFAF463734}"/>
-              </a:ext>
-            </a:extLst>
-          </p:cNvPr>
-          <p:cNvSpPr>
-            <a:spLocks noGrp="1"/>
-          </p:cNvSpPr>
-          <p:nvPr>
-            <p:ph type="ftr" sz="quarter" idx="11"/>
-          </p:nvPr>
-        </p:nvSpPr>
-        <p:spPr/>
-        <p:txBody>
-          <a:bodyPr/>
-          <a:lstStyle/>
-          <a:p>
-            <a:r>
-              <a:rPr lang="en-US"/>
-              <a:t>Using Microsoft Word for preparing XML TEI-compliant digital editions</a:t>
-            </a:r>
-            <a:endParaRPr lang="cs-CZ" dirty="0"/>
-          </a:p>
-        </p:txBody>
-      </p:sp>
       <p:pic>
         <p:nvPicPr>
           <p:cNvPr id="9" name="Obrázek 8">
@@ -13714,6 +14252,93 @@
           </a:prstGeom>
         </p:spPr>
       </p:pic>
+      <p:sp>
+        <p:nvSpPr>
+          <p:cNvPr id="3" name="Zástupný symbol pro datum 2">
+            <a:extLst>
+              <a:ext uri="{FF2B5EF4-FFF2-40B4-BE49-F238E27FC236}">
+                <a16:creationId xmlns:a16="http://schemas.microsoft.com/office/drawing/2014/main" id="{0C583855-2E5E-48A5-92B9-FFC344EDCEAF}"/>
+              </a:ext>
+            </a:extLst>
+          </p:cNvPr>
+          <p:cNvSpPr>
+            <a:spLocks noGrp="1"/>
+          </p:cNvSpPr>
+          <p:nvPr>
+            <p:ph type="dt" sz="half" idx="10"/>
+          </p:nvPr>
+        </p:nvSpPr>
+        <p:spPr/>
+        <p:txBody>
+          <a:bodyPr/>
+          <a:lstStyle/>
+          <a:p>
+            <a:r>
+              <a:rPr lang="cs-CZ"/>
+              <a:t>TEI 2019, Graz, 2019-09-20</a:t>
+            </a:r>
+            <a:endParaRPr lang="cs-CZ" dirty="0"/>
+          </a:p>
+        </p:txBody>
+      </p:sp>
+      <p:sp>
+        <p:nvSpPr>
+          <p:cNvPr id="6" name="Zástupný symbol pro zápatí 5">
+            <a:extLst>
+              <a:ext uri="{FF2B5EF4-FFF2-40B4-BE49-F238E27FC236}">
+                <a16:creationId xmlns:a16="http://schemas.microsoft.com/office/drawing/2014/main" id="{5B52082A-7EA9-4C6B-A0F2-2572CF74E636}"/>
+              </a:ext>
+            </a:extLst>
+          </p:cNvPr>
+          <p:cNvSpPr>
+            <a:spLocks noGrp="1"/>
+          </p:cNvSpPr>
+          <p:nvPr>
+            <p:ph type="ftr" sz="quarter" idx="11"/>
+          </p:nvPr>
+        </p:nvSpPr>
+        <p:spPr/>
+        <p:txBody>
+          <a:bodyPr/>
+          <a:lstStyle/>
+          <a:p>
+            <a:r>
+              <a:rPr lang="en-US"/>
+              <a:t>Using Microsoft Word for preparing XML TEI-compliant digital editions</a:t>
+            </a:r>
+            <a:endParaRPr lang="cs-CZ" dirty="0"/>
+          </a:p>
+        </p:txBody>
+      </p:sp>
+      <p:sp>
+        <p:nvSpPr>
+          <p:cNvPr id="7" name="Zástupný symbol pro číslo snímku 6">
+            <a:extLst>
+              <a:ext uri="{FF2B5EF4-FFF2-40B4-BE49-F238E27FC236}">
+                <a16:creationId xmlns:a16="http://schemas.microsoft.com/office/drawing/2014/main" id="{1EDCE9E2-5D3B-4C65-B1CB-C85B3216D5CF}"/>
+              </a:ext>
+            </a:extLst>
+          </p:cNvPr>
+          <p:cNvSpPr>
+            <a:spLocks noGrp="1"/>
+          </p:cNvSpPr>
+          <p:nvPr>
+            <p:ph type="sldNum" sz="quarter" idx="12"/>
+          </p:nvPr>
+        </p:nvSpPr>
+        <p:spPr/>
+        <p:txBody>
+          <a:bodyPr/>
+          <a:lstStyle/>
+          <a:p>
+            <a:fld id="{5B64AE77-6BC1-49CA-AA73-E9D0D5F1D944}" type="slidenum">
+              <a:rPr lang="cs-CZ" smtClean="0"/>
+              <a:t>9</a:t>
+            </a:fld>
+            <a:endParaRPr lang="cs-CZ" dirty="0"/>
+          </a:p>
+        </p:txBody>
+      </p:sp>
     </p:spTree>
     <p:extLst>
       <p:ext uri="{BB962C8B-B14F-4D97-AF65-F5344CB8AC3E}">

</xml_diff>